<commit_message>
Update Presentation for 30th jan 2019.pptx
</commit_message>
<xml_diff>
--- a/Architechtures of the internet of things/Semester 1/Report and demo presentation/Presentation for 30th jan 2019.pptx
+++ b/Architechtures of the internet of things/Semester 1/Report and demo presentation/Presentation for 30th jan 2019.pptx
@@ -8,7 +8,9 @@
     <p:sldId id="256" r:id="rId2"/>
     <p:sldId id="259" r:id="rId3"/>
     <p:sldId id="257" r:id="rId4"/>
-    <p:sldId id="258" r:id="rId5"/>
+    <p:sldId id="261" r:id="rId5"/>
+    <p:sldId id="258" r:id="rId6"/>
+    <p:sldId id="260" r:id="rId7"/>
   </p:sldIdLst>
   <p:sldSz cx="12192000" cy="6858000"/>
   <p:notesSz cx="6858000" cy="9144000"/>
@@ -3681,6 +3683,116 @@
           <p:cNvPr id="2" name="Title 1">
             <a:extLst>
               <a:ext uri="{FF2B5EF4-FFF2-40B4-BE49-F238E27FC236}">
+                <a16:creationId xmlns:a16="http://schemas.microsoft.com/office/drawing/2014/main" id="{35737F27-ED45-4DE8-A696-B322CDA9AB37}"/>
+              </a:ext>
+            </a:extLst>
+          </p:cNvPr>
+          <p:cNvSpPr>
+            <a:spLocks noGrp="1"/>
+          </p:cNvSpPr>
+          <p:nvPr>
+            <p:ph type="title"/>
+          </p:nvPr>
+        </p:nvSpPr>
+        <p:spPr/>
+        <p:txBody>
+          <a:bodyPr/>
+          <a:lstStyle/>
+          <a:p>
+            <a:endParaRPr lang="en-GB"/>
+          </a:p>
+        </p:txBody>
+      </p:sp>
+      <p:sp>
+        <p:nvSpPr>
+          <p:cNvPr id="3" name="Content Placeholder 2">
+            <a:extLst>
+              <a:ext uri="{FF2B5EF4-FFF2-40B4-BE49-F238E27FC236}">
+                <a16:creationId xmlns:a16="http://schemas.microsoft.com/office/drawing/2014/main" id="{10E18FB1-6CF3-4284-9B0F-686AABB2DB60}"/>
+              </a:ext>
+            </a:extLst>
+          </p:cNvPr>
+          <p:cNvSpPr>
+            <a:spLocks noGrp="1"/>
+          </p:cNvSpPr>
+          <p:nvPr>
+            <p:ph idx="1"/>
+          </p:nvPr>
+        </p:nvSpPr>
+        <p:spPr/>
+        <p:txBody>
+          <a:bodyPr/>
+          <a:lstStyle/>
+          <a:p>
+            <a:endParaRPr lang="en-GB"/>
+          </a:p>
+        </p:txBody>
+      </p:sp>
+      <p:pic>
+        <p:nvPicPr>
+          <p:cNvPr id="4" name="Picture 3">
+            <a:extLst>
+              <a:ext uri="{FF2B5EF4-FFF2-40B4-BE49-F238E27FC236}">
+                <a16:creationId xmlns:a16="http://schemas.microsoft.com/office/drawing/2014/main" id="{02510DF8-0CBA-478A-8A90-ED731D8EF934}"/>
+              </a:ext>
+            </a:extLst>
+          </p:cNvPr>
+          <p:cNvPicPr>
+            <a:picLocks noChangeAspect="1"/>
+          </p:cNvPicPr>
+          <p:nvPr/>
+        </p:nvPicPr>
+        <p:blipFill>
+          <a:blip r:embed="rId2"/>
+          <a:stretch>
+            <a:fillRect/>
+          </a:stretch>
+        </p:blipFill>
+        <p:spPr>
+          <a:xfrm>
+            <a:off x="2491818" y="407201"/>
+            <a:ext cx="7208364" cy="6043598"/>
+          </a:xfrm>
+          <a:prstGeom prst="rect">
+            <a:avLst/>
+          </a:prstGeom>
+        </p:spPr>
+      </p:pic>
+    </p:spTree>
+    <p:extLst>
+      <p:ext uri="{BB962C8B-B14F-4D97-AF65-F5344CB8AC3E}">
+        <p14:creationId xmlns:p14="http://schemas.microsoft.com/office/powerpoint/2010/main" val="3140695677"/>
+      </p:ext>
+    </p:extLst>
+  </p:cSld>
+  <p:clrMapOvr>
+    <a:masterClrMapping/>
+  </p:clrMapOvr>
+</p:sld>
+</file>
+
+<file path=ppt/slides/slide5.xml><?xml version="1.0" encoding="utf-8"?>
+<p:sld xmlns:a="http://schemas.openxmlformats.org/drawingml/2006/main" xmlns:r="http://schemas.openxmlformats.org/officeDocument/2006/relationships" xmlns:p="http://schemas.openxmlformats.org/presentationml/2006/main">
+  <p:cSld>
+    <p:spTree>
+      <p:nvGrpSpPr>
+        <p:cNvPr id="1" name=""/>
+        <p:cNvGrpSpPr/>
+        <p:nvPr/>
+      </p:nvGrpSpPr>
+      <p:grpSpPr>
+        <a:xfrm>
+          <a:off x="0" y="0"/>
+          <a:ext cx="0" cy="0"/>
+          <a:chOff x="0" y="0"/>
+          <a:chExt cx="0" cy="0"/>
+        </a:xfrm>
+      </p:grpSpPr>
+      <p:sp>
+        <p:nvSpPr>
+          <p:cNvPr id="2" name="Title 1">
+            <a:extLst>
+              <a:ext uri="{FF2B5EF4-FFF2-40B4-BE49-F238E27FC236}">
                 <a16:creationId xmlns:a16="http://schemas.microsoft.com/office/drawing/2014/main" id="{7B2A3BE2-E690-479F-88D7-D15BDB9819DD}"/>
               </a:ext>
             </a:extLst>
@@ -3748,6 +3860,115 @@
     <p:extLst>
       <p:ext uri="{BB962C8B-B14F-4D97-AF65-F5344CB8AC3E}">
         <p14:creationId xmlns:p14="http://schemas.microsoft.com/office/powerpoint/2010/main" val="3975584685"/>
+      </p:ext>
+    </p:extLst>
+  </p:cSld>
+  <p:clrMapOvr>
+    <a:masterClrMapping/>
+  </p:clrMapOvr>
+</p:sld>
+</file>
+
+<file path=ppt/slides/slide6.xml><?xml version="1.0" encoding="utf-8"?>
+<p:sld xmlns:a="http://schemas.openxmlformats.org/drawingml/2006/main" xmlns:r="http://schemas.openxmlformats.org/officeDocument/2006/relationships" xmlns:p="http://schemas.openxmlformats.org/presentationml/2006/main">
+  <p:cSld>
+    <p:spTree>
+      <p:nvGrpSpPr>
+        <p:cNvPr id="1" name=""/>
+        <p:cNvGrpSpPr/>
+        <p:nvPr/>
+      </p:nvGrpSpPr>
+      <p:grpSpPr>
+        <a:xfrm>
+          <a:off x="0" y="0"/>
+          <a:ext cx="0" cy="0"/>
+          <a:chOff x="0" y="0"/>
+          <a:chExt cx="0" cy="0"/>
+        </a:xfrm>
+      </p:grpSpPr>
+      <p:sp>
+        <p:nvSpPr>
+          <p:cNvPr id="2" name="Title 1">
+            <a:extLst>
+              <a:ext uri="{FF2B5EF4-FFF2-40B4-BE49-F238E27FC236}">
+                <a16:creationId xmlns:a16="http://schemas.microsoft.com/office/drawing/2014/main" id="{2091A292-03DC-4DEF-AFF1-57E32164C410}"/>
+              </a:ext>
+            </a:extLst>
+          </p:cNvPr>
+          <p:cNvSpPr>
+            <a:spLocks noGrp="1"/>
+          </p:cNvSpPr>
+          <p:nvPr>
+            <p:ph type="title"/>
+          </p:nvPr>
+        </p:nvSpPr>
+        <p:spPr/>
+        <p:txBody>
+          <a:bodyPr/>
+          <a:lstStyle/>
+          <a:p>
+            <a:endParaRPr lang="en-GB"/>
+          </a:p>
+        </p:txBody>
+      </p:sp>
+      <p:sp>
+        <p:nvSpPr>
+          <p:cNvPr id="3" name="Content Placeholder 2">
+            <a:extLst>
+              <a:ext uri="{FF2B5EF4-FFF2-40B4-BE49-F238E27FC236}">
+                <a16:creationId xmlns:a16="http://schemas.microsoft.com/office/drawing/2014/main" id="{E9985403-1F97-48AB-8620-04C6A5DC14A3}"/>
+              </a:ext>
+            </a:extLst>
+          </p:cNvPr>
+          <p:cNvSpPr>
+            <a:spLocks noGrp="1"/>
+          </p:cNvSpPr>
+          <p:nvPr>
+            <p:ph idx="1"/>
+          </p:nvPr>
+        </p:nvSpPr>
+        <p:spPr/>
+        <p:txBody>
+          <a:bodyPr/>
+          <a:lstStyle/>
+          <a:p>
+            <a:endParaRPr lang="en-GB" dirty="0"/>
+          </a:p>
+        </p:txBody>
+      </p:sp>
+      <p:pic>
+        <p:nvPicPr>
+          <p:cNvPr id="4" name="Picture 3">
+            <a:extLst>
+              <a:ext uri="{FF2B5EF4-FFF2-40B4-BE49-F238E27FC236}">
+                <a16:creationId xmlns:a16="http://schemas.microsoft.com/office/drawing/2014/main" id="{BBBBE877-95FD-4882-A0CD-7791AE1A14FF}"/>
+              </a:ext>
+            </a:extLst>
+          </p:cNvPr>
+          <p:cNvPicPr>
+            <a:picLocks noChangeAspect="1"/>
+          </p:cNvPicPr>
+          <p:nvPr/>
+        </p:nvPicPr>
+        <p:blipFill rotWithShape="1">
+          <a:blip r:embed="rId2"/>
+          <a:srcRect l="44073" t="18067" r="7447" b="22037"/>
+          <a:stretch/>
+        </p:blipFill>
+        <p:spPr>
+          <a:xfrm>
+            <a:off x="772891" y="1315039"/>
+            <a:ext cx="10646218" cy="4227922"/>
+          </a:xfrm>
+          <a:prstGeom prst="rect">
+            <a:avLst/>
+          </a:prstGeom>
+        </p:spPr>
+      </p:pic>
+    </p:spTree>
+    <p:extLst>
+      <p:ext uri="{BB962C8B-B14F-4D97-AF65-F5344CB8AC3E}">
+        <p14:creationId xmlns:p14="http://schemas.microsoft.com/office/powerpoint/2010/main" val="406757473"/>
       </p:ext>
     </p:extLst>
   </p:cSld>

</xml_diff>